<commit_message>
change some features in models
</commit_message>
<xml_diff>
--- a/1_lundi/EPHE certificat analyse de données avancé  lundi introduction.pptx
+++ b/1_lundi/EPHE certificat analyse de données avancé  lundi introduction.pptx
@@ -5,7 +5,7 @@
     <p:sldMasterId id="2147483660" r:id="rId1"/>
   </p:sldMasterIdLst>
   <p:notesMasterIdLst>
-    <p:notesMasterId r:id="rId25"/>
+    <p:notesMasterId r:id="rId26"/>
   </p:notesMasterIdLst>
   <p:sldIdLst>
     <p:sldId id="300" r:id="rId2"/>
@@ -30,7 +30,8 @@
     <p:sldId id="327" r:id="rId21"/>
     <p:sldId id="307" r:id="rId22"/>
     <p:sldId id="323" r:id="rId23"/>
-    <p:sldId id="328" r:id="rId24"/>
+    <p:sldId id="502" r:id="rId24"/>
+    <p:sldId id="328" r:id="rId25"/>
   </p:sldIdLst>
   <p:sldSz cx="9144000" cy="6858000" type="screen4x3"/>
   <p:notesSz cx="6858000" cy="9144000"/>
@@ -219,7 +220,7 @@
           <a:p>
             <a:fld id="{9A6A32B6-9C77-4AAE-AE32-BC4E1DBB57AE}" type="datetimeFigureOut">
               <a:rPr lang="fr-FR" smtClean="0"/>
-              <a:t>18/03/2023</a:t>
+              <a:t>31/03/2025</a:t>
             </a:fld>
             <a:endParaRPr lang="fr-FR"/>
           </a:p>
@@ -617,7 +618,7 @@
           <a:p>
             <a:fld id="{E4EBD4B5-1D9F-4B38-B04C-CDF79E6DE625}" type="datetime1">
               <a:rPr lang="fr-FR" smtClean="0"/>
-              <a:t>18/03/2023</a:t>
+              <a:t>31/03/2025</a:t>
             </a:fld>
             <a:endParaRPr lang="fr-FR"/>
           </a:p>
@@ -787,7 +788,7 @@
           <a:p>
             <a:fld id="{5AF368F1-27B7-4C9A-849B-1C6BF398BAEE}" type="datetime1">
               <a:rPr lang="fr-FR" smtClean="0"/>
-              <a:t>18/03/2023</a:t>
+              <a:t>31/03/2025</a:t>
             </a:fld>
             <a:endParaRPr lang="fr-FR"/>
           </a:p>
@@ -967,7 +968,7 @@
           <a:p>
             <a:fld id="{32651009-9D13-46BF-A29D-ECD912B857DB}" type="datetime1">
               <a:rPr lang="fr-FR" smtClean="0"/>
-              <a:t>18/03/2023</a:t>
+              <a:t>31/03/2025</a:t>
             </a:fld>
             <a:endParaRPr lang="fr-FR"/>
           </a:p>
@@ -1175,7 +1176,7 @@
           <a:p>
             <a:fld id="{2CC3E27C-9EEC-4DEA-99EF-CEA793B32779}" type="datetime1">
               <a:rPr lang="fr-FR" smtClean="0"/>
-              <a:t>18/03/2023</a:t>
+              <a:t>31/03/2025</a:t>
             </a:fld>
             <a:endParaRPr lang="fr-FR"/>
           </a:p>
@@ -1432,7 +1433,7 @@
           <a:p>
             <a:fld id="{64635492-459E-4914-9B3D-878FCF8C7DB8}" type="datetime1">
               <a:rPr lang="fr-FR" smtClean="0"/>
-              <a:t>18/03/2023</a:t>
+              <a:t>31/03/2025</a:t>
             </a:fld>
             <a:endParaRPr lang="fr-FR"/>
           </a:p>
@@ -1664,7 +1665,7 @@
           <a:p>
             <a:fld id="{DEED2623-FA3A-498B-8030-E379CECF8B23}" type="datetime1">
               <a:rPr lang="fr-FR" smtClean="0"/>
-              <a:t>18/03/2023</a:t>
+              <a:t>31/03/2025</a:t>
             </a:fld>
             <a:endParaRPr lang="fr-FR"/>
           </a:p>
@@ -2031,7 +2032,7 @@
           <a:p>
             <a:fld id="{A74D9B75-8742-4038-854B-6036B5F961F4}" type="datetime1">
               <a:rPr lang="fr-FR" smtClean="0"/>
-              <a:t>18/03/2023</a:t>
+              <a:t>31/03/2025</a:t>
             </a:fld>
             <a:endParaRPr lang="fr-FR"/>
           </a:p>
@@ -2149,7 +2150,7 @@
           <a:p>
             <a:fld id="{55874413-4157-4295-97E0-CF79B466227E}" type="datetime1">
               <a:rPr lang="fr-FR" smtClean="0"/>
-              <a:t>18/03/2023</a:t>
+              <a:t>31/03/2025</a:t>
             </a:fld>
             <a:endParaRPr lang="fr-FR"/>
           </a:p>
@@ -2244,7 +2245,7 @@
           <a:p>
             <a:fld id="{D6F9A39A-6CF6-4CA9-9210-E2C153DE94BC}" type="datetime1">
               <a:rPr lang="fr-FR" smtClean="0"/>
-              <a:t>18/03/2023</a:t>
+              <a:t>31/03/2025</a:t>
             </a:fld>
             <a:endParaRPr lang="fr-FR"/>
           </a:p>
@@ -2521,7 +2522,7 @@
           <a:p>
             <a:fld id="{F52A6FD3-610D-4EC8-9A58-443A3A2B3BAE}" type="datetime1">
               <a:rPr lang="fr-FR" smtClean="0"/>
-              <a:t>18/03/2023</a:t>
+              <a:t>31/03/2025</a:t>
             </a:fld>
             <a:endParaRPr lang="fr-FR"/>
           </a:p>
@@ -2778,7 +2779,7 @@
           <a:p>
             <a:fld id="{01C333D9-C52F-4662-B1E8-D24F05164AAD}" type="datetime1">
               <a:rPr lang="fr-FR" smtClean="0"/>
-              <a:t>18/03/2023</a:t>
+              <a:t>31/03/2025</a:t>
             </a:fld>
             <a:endParaRPr lang="fr-FR"/>
           </a:p>
@@ -2991,7 +2992,7 @@
           <a:p>
             <a:fld id="{EF969543-86AA-4FF0-AE0E-51CE4264A11A}" type="datetime1">
               <a:rPr lang="fr-FR" smtClean="0"/>
-              <a:t>18/03/2023</a:t>
+              <a:t>31/03/2025</a:t>
             </a:fld>
             <a:endParaRPr lang="fr-FR"/>
           </a:p>
@@ -3668,7 +3669,7 @@
             </a:pPr>
             <a:r>
               <a:rPr lang="fr-FR" sz="1600" dirty="0"/>
-              <a:t>Version mars 2023</a:t>
+              <a:t>Version mars 2025</a:t>
             </a:r>
           </a:p>
           <a:p>
@@ -3729,7 +3730,7 @@
           <p:cNvPr id="2" name="Espace réservé du numéro de diapositive 1">
             <a:extLst>
               <a:ext uri="{FF2B5EF4-FFF2-40B4-BE49-F238E27FC236}">
-                <a16:creationId xmlns:a16="http://schemas.microsoft.com/office/drawing/2014/main" xmlns="" id="{6BEDF52F-A1F1-49A7-9D42-807320EFBDAA}"/>
+                <a16:creationId xmlns:a16="http://schemas.microsoft.com/office/drawing/2014/main" id="{6BEDF52F-A1F1-49A7-9D42-807320EFBDAA}"/>
               </a:ext>
             </a:extLst>
           </p:cNvPr>
@@ -4360,7 +4361,7 @@
           <p:cNvPr id="2" name="Espace réservé du numéro de diapositive 1">
             <a:extLst>
               <a:ext uri="{FF2B5EF4-FFF2-40B4-BE49-F238E27FC236}">
-                <a16:creationId xmlns:a16="http://schemas.microsoft.com/office/drawing/2014/main" xmlns="" id="{500E893E-431E-477C-9463-B25838CB1AF1}"/>
+                <a16:creationId xmlns:a16="http://schemas.microsoft.com/office/drawing/2014/main" id="{500E893E-431E-477C-9463-B25838CB1AF1}"/>
               </a:ext>
             </a:extLst>
           </p:cNvPr>
@@ -5073,7 +5074,7 @@
           <p:cNvPr id="2" name="Espace réservé du numéro de diapositive 1">
             <a:extLst>
               <a:ext uri="{FF2B5EF4-FFF2-40B4-BE49-F238E27FC236}">
-                <a16:creationId xmlns:a16="http://schemas.microsoft.com/office/drawing/2014/main" xmlns="" id="{25413158-0CFF-4433-825C-BD8489794190}"/>
+                <a16:creationId xmlns:a16="http://schemas.microsoft.com/office/drawing/2014/main" id="{25413158-0CFF-4433-825C-BD8489794190}"/>
               </a:ext>
             </a:extLst>
           </p:cNvPr>
@@ -5723,7 +5724,7 @@
           <p:cNvPr id="2" name="Espace réservé du numéro de diapositive 1">
             <a:extLst>
               <a:ext uri="{FF2B5EF4-FFF2-40B4-BE49-F238E27FC236}">
-                <a16:creationId xmlns:a16="http://schemas.microsoft.com/office/drawing/2014/main" xmlns="" id="{A522ACD2-30A8-4237-86A1-60651A6E1C12}"/>
+                <a16:creationId xmlns:a16="http://schemas.microsoft.com/office/drawing/2014/main" id="{A522ACD2-30A8-4237-86A1-60651A6E1C12}"/>
               </a:ext>
             </a:extLst>
           </p:cNvPr>
@@ -6333,7 +6334,7 @@
           <p:cNvPr id="2" name="Espace réservé du numéro de diapositive 1">
             <a:extLst>
               <a:ext uri="{FF2B5EF4-FFF2-40B4-BE49-F238E27FC236}">
-                <a16:creationId xmlns:a16="http://schemas.microsoft.com/office/drawing/2014/main" xmlns="" id="{43E170F6-C397-480E-9F82-06BFF3650315}"/>
+                <a16:creationId xmlns:a16="http://schemas.microsoft.com/office/drawing/2014/main" id="{43E170F6-C397-480E-9F82-06BFF3650315}"/>
               </a:ext>
             </a:extLst>
           </p:cNvPr>
@@ -6939,7 +6940,7 @@
           <p:cNvPr id="2" name="Espace réservé du numéro de diapositive 1">
             <a:extLst>
               <a:ext uri="{FF2B5EF4-FFF2-40B4-BE49-F238E27FC236}">
-                <a16:creationId xmlns:a16="http://schemas.microsoft.com/office/drawing/2014/main" xmlns="" id="{9BD40BEB-1778-415A-A7CF-F8B5DCDE8B79}"/>
+                <a16:creationId xmlns:a16="http://schemas.microsoft.com/office/drawing/2014/main" id="{9BD40BEB-1778-415A-A7CF-F8B5DCDE8B79}"/>
               </a:ext>
             </a:extLst>
           </p:cNvPr>
@@ -6999,7 +7000,7 @@
           <p:cNvPr id="17" name="Rectangle 16">
             <a:extLst>
               <a:ext uri="{FF2B5EF4-FFF2-40B4-BE49-F238E27FC236}">
-                <a16:creationId xmlns:a16="http://schemas.microsoft.com/office/drawing/2014/main" xmlns="" id="{FD3615DE-5BDA-18B9-571A-4C849DD6C626}"/>
+                <a16:creationId xmlns:a16="http://schemas.microsoft.com/office/drawing/2014/main" id="{FD3615DE-5BDA-18B9-571A-4C849DD6C626}"/>
               </a:ext>
             </a:extLst>
           </p:cNvPr>
@@ -7054,7 +7055,7 @@
           <p:cNvPr id="4" name="Espace réservé du numéro de diapositive 3">
             <a:extLst>
               <a:ext uri="{FF2B5EF4-FFF2-40B4-BE49-F238E27FC236}">
-                <a16:creationId xmlns:a16="http://schemas.microsoft.com/office/drawing/2014/main" xmlns="" id="{6CE0B363-0A4F-F7AB-9B5E-E4FA59E704FD}"/>
+                <a16:creationId xmlns:a16="http://schemas.microsoft.com/office/drawing/2014/main" id="{6CE0B363-0A4F-F7AB-9B5E-E4FA59E704FD}"/>
               </a:ext>
             </a:extLst>
           </p:cNvPr>
@@ -7084,7 +7085,7 @@
           <p:cNvPr id="6" name="Connecteur droit 5">
             <a:extLst>
               <a:ext uri="{FF2B5EF4-FFF2-40B4-BE49-F238E27FC236}">
-                <a16:creationId xmlns:a16="http://schemas.microsoft.com/office/drawing/2014/main" xmlns="" id="{C8C0B7DE-409B-C260-E2AA-F6105134D738}"/>
+                <a16:creationId xmlns:a16="http://schemas.microsoft.com/office/drawing/2014/main" id="{C8C0B7DE-409B-C260-E2AA-F6105134D738}"/>
               </a:ext>
             </a:extLst>
           </p:cNvPr>
@@ -7128,7 +7129,7 @@
           <p:cNvPr id="7" name="Connecteur droit 6">
             <a:extLst>
               <a:ext uri="{FF2B5EF4-FFF2-40B4-BE49-F238E27FC236}">
-                <a16:creationId xmlns:a16="http://schemas.microsoft.com/office/drawing/2014/main" xmlns="" id="{3B46BF8F-6AA3-1C96-60BB-E05D5BA4BA47}"/>
+                <a16:creationId xmlns:a16="http://schemas.microsoft.com/office/drawing/2014/main" id="{3B46BF8F-6AA3-1C96-60BB-E05D5BA4BA47}"/>
               </a:ext>
             </a:extLst>
           </p:cNvPr>
@@ -7174,7 +7175,7 @@
           <p:cNvPr id="10" name="Connecteur droit 9">
             <a:extLst>
               <a:ext uri="{FF2B5EF4-FFF2-40B4-BE49-F238E27FC236}">
-                <a16:creationId xmlns:a16="http://schemas.microsoft.com/office/drawing/2014/main" xmlns="" id="{84B32B3C-35D3-AD76-9E44-FB1B95CC8198}"/>
+                <a16:creationId xmlns:a16="http://schemas.microsoft.com/office/drawing/2014/main" id="{84B32B3C-35D3-AD76-9E44-FB1B95CC8198}"/>
               </a:ext>
             </a:extLst>
           </p:cNvPr>
@@ -7220,7 +7221,7 @@
           <p:cNvPr id="13" name="ZoneTexte 12">
             <a:extLst>
               <a:ext uri="{FF2B5EF4-FFF2-40B4-BE49-F238E27FC236}">
-                <a16:creationId xmlns:a16="http://schemas.microsoft.com/office/drawing/2014/main" xmlns="" id="{B0B62E48-6C0E-64A0-89DA-879357075E02}"/>
+                <a16:creationId xmlns:a16="http://schemas.microsoft.com/office/drawing/2014/main" id="{B0B62E48-6C0E-64A0-89DA-879357075E02}"/>
               </a:ext>
             </a:extLst>
           </p:cNvPr>
@@ -7255,7 +7256,7 @@
           <p:cNvPr id="14" name="ZoneTexte 13">
             <a:extLst>
               <a:ext uri="{FF2B5EF4-FFF2-40B4-BE49-F238E27FC236}">
-                <a16:creationId xmlns:a16="http://schemas.microsoft.com/office/drawing/2014/main" xmlns="" id="{F5B6E875-A89F-BD6D-CC40-0001FF44BFDC}"/>
+                <a16:creationId xmlns:a16="http://schemas.microsoft.com/office/drawing/2014/main" id="{F5B6E875-A89F-BD6D-CC40-0001FF44BFDC}"/>
               </a:ext>
             </a:extLst>
           </p:cNvPr>
@@ -7290,7 +7291,7 @@
           <p:cNvPr id="15" name="ZoneTexte 14">
             <a:extLst>
               <a:ext uri="{FF2B5EF4-FFF2-40B4-BE49-F238E27FC236}">
-                <a16:creationId xmlns:a16="http://schemas.microsoft.com/office/drawing/2014/main" xmlns="" id="{7742D149-0729-5AB6-4F50-126876C6415C}"/>
+                <a16:creationId xmlns:a16="http://schemas.microsoft.com/office/drawing/2014/main" id="{7742D149-0729-5AB6-4F50-126876C6415C}"/>
               </a:ext>
             </a:extLst>
           </p:cNvPr>
@@ -7325,7 +7326,7 @@
           <p:cNvPr id="16" name="ZoneTexte 15">
             <a:extLst>
               <a:ext uri="{FF2B5EF4-FFF2-40B4-BE49-F238E27FC236}">
-                <a16:creationId xmlns:a16="http://schemas.microsoft.com/office/drawing/2014/main" xmlns="" id="{649F4A62-8C34-A822-6759-D65626E8D604}"/>
+                <a16:creationId xmlns:a16="http://schemas.microsoft.com/office/drawing/2014/main" id="{649F4A62-8C34-A822-6759-D65626E8D604}"/>
               </a:ext>
             </a:extLst>
           </p:cNvPr>
@@ -7394,7 +7395,7 @@
           <p:cNvPr id="17" name="Rectangle 16">
             <a:extLst>
               <a:ext uri="{FF2B5EF4-FFF2-40B4-BE49-F238E27FC236}">
-                <a16:creationId xmlns:a16="http://schemas.microsoft.com/office/drawing/2014/main" xmlns="" id="{FD3615DE-5BDA-18B9-571A-4C849DD6C626}"/>
+                <a16:creationId xmlns:a16="http://schemas.microsoft.com/office/drawing/2014/main" id="{FD3615DE-5BDA-18B9-571A-4C849DD6C626}"/>
               </a:ext>
             </a:extLst>
           </p:cNvPr>
@@ -7449,7 +7450,7 @@
           <p:cNvPr id="4" name="Espace réservé du numéro de diapositive 3">
             <a:extLst>
               <a:ext uri="{FF2B5EF4-FFF2-40B4-BE49-F238E27FC236}">
-                <a16:creationId xmlns:a16="http://schemas.microsoft.com/office/drawing/2014/main" xmlns="" id="{6CE0B363-0A4F-F7AB-9B5E-E4FA59E704FD}"/>
+                <a16:creationId xmlns:a16="http://schemas.microsoft.com/office/drawing/2014/main" id="{6CE0B363-0A4F-F7AB-9B5E-E4FA59E704FD}"/>
               </a:ext>
             </a:extLst>
           </p:cNvPr>
@@ -7479,7 +7480,7 @@
           <p:cNvPr id="6" name="Connecteur droit 5">
             <a:extLst>
               <a:ext uri="{FF2B5EF4-FFF2-40B4-BE49-F238E27FC236}">
-                <a16:creationId xmlns:a16="http://schemas.microsoft.com/office/drawing/2014/main" xmlns="" id="{C8C0B7DE-409B-C260-E2AA-F6105134D738}"/>
+                <a16:creationId xmlns:a16="http://schemas.microsoft.com/office/drawing/2014/main" id="{C8C0B7DE-409B-C260-E2AA-F6105134D738}"/>
               </a:ext>
             </a:extLst>
           </p:cNvPr>
@@ -7523,7 +7524,7 @@
           <p:cNvPr id="7" name="Connecteur droit 6">
             <a:extLst>
               <a:ext uri="{FF2B5EF4-FFF2-40B4-BE49-F238E27FC236}">
-                <a16:creationId xmlns:a16="http://schemas.microsoft.com/office/drawing/2014/main" xmlns="" id="{3B46BF8F-6AA3-1C96-60BB-E05D5BA4BA47}"/>
+                <a16:creationId xmlns:a16="http://schemas.microsoft.com/office/drawing/2014/main" id="{3B46BF8F-6AA3-1C96-60BB-E05D5BA4BA47}"/>
               </a:ext>
             </a:extLst>
           </p:cNvPr>
@@ -7569,7 +7570,7 @@
           <p:cNvPr id="10" name="Connecteur droit 9">
             <a:extLst>
               <a:ext uri="{FF2B5EF4-FFF2-40B4-BE49-F238E27FC236}">
-                <a16:creationId xmlns:a16="http://schemas.microsoft.com/office/drawing/2014/main" xmlns="" id="{84B32B3C-35D3-AD76-9E44-FB1B95CC8198}"/>
+                <a16:creationId xmlns:a16="http://schemas.microsoft.com/office/drawing/2014/main" id="{84B32B3C-35D3-AD76-9E44-FB1B95CC8198}"/>
               </a:ext>
             </a:extLst>
           </p:cNvPr>
@@ -7615,7 +7616,7 @@
           <p:cNvPr id="13" name="ZoneTexte 12">
             <a:extLst>
               <a:ext uri="{FF2B5EF4-FFF2-40B4-BE49-F238E27FC236}">
-                <a16:creationId xmlns:a16="http://schemas.microsoft.com/office/drawing/2014/main" xmlns="" id="{B0B62E48-6C0E-64A0-89DA-879357075E02}"/>
+                <a16:creationId xmlns:a16="http://schemas.microsoft.com/office/drawing/2014/main" id="{B0B62E48-6C0E-64A0-89DA-879357075E02}"/>
               </a:ext>
             </a:extLst>
           </p:cNvPr>
@@ -7650,7 +7651,7 @@
           <p:cNvPr id="14" name="ZoneTexte 13">
             <a:extLst>
               <a:ext uri="{FF2B5EF4-FFF2-40B4-BE49-F238E27FC236}">
-                <a16:creationId xmlns:a16="http://schemas.microsoft.com/office/drawing/2014/main" xmlns="" id="{F5B6E875-A89F-BD6D-CC40-0001FF44BFDC}"/>
+                <a16:creationId xmlns:a16="http://schemas.microsoft.com/office/drawing/2014/main" id="{F5B6E875-A89F-BD6D-CC40-0001FF44BFDC}"/>
               </a:ext>
             </a:extLst>
           </p:cNvPr>
@@ -7685,7 +7686,7 @@
           <p:cNvPr id="15" name="ZoneTexte 14">
             <a:extLst>
               <a:ext uri="{FF2B5EF4-FFF2-40B4-BE49-F238E27FC236}">
-                <a16:creationId xmlns:a16="http://schemas.microsoft.com/office/drawing/2014/main" xmlns="" id="{7742D149-0729-5AB6-4F50-126876C6415C}"/>
+                <a16:creationId xmlns:a16="http://schemas.microsoft.com/office/drawing/2014/main" id="{7742D149-0729-5AB6-4F50-126876C6415C}"/>
               </a:ext>
             </a:extLst>
           </p:cNvPr>
@@ -7720,7 +7721,7 @@
           <p:cNvPr id="16" name="ZoneTexte 15">
             <a:extLst>
               <a:ext uri="{FF2B5EF4-FFF2-40B4-BE49-F238E27FC236}">
-                <a16:creationId xmlns:a16="http://schemas.microsoft.com/office/drawing/2014/main" xmlns="" id="{649F4A62-8C34-A822-6759-D65626E8D604}"/>
+                <a16:creationId xmlns:a16="http://schemas.microsoft.com/office/drawing/2014/main" id="{649F4A62-8C34-A822-6759-D65626E8D604}"/>
               </a:ext>
             </a:extLst>
           </p:cNvPr>
@@ -7759,7 +7760,7 @@
           <p:cNvPr id="2" name="Rectangle 1">
             <a:extLst>
               <a:ext uri="{FF2B5EF4-FFF2-40B4-BE49-F238E27FC236}">
-                <a16:creationId xmlns:a16="http://schemas.microsoft.com/office/drawing/2014/main" xmlns="" id="{D74148BD-425C-1E1C-2EF7-22F190D3F29F}"/>
+                <a16:creationId xmlns:a16="http://schemas.microsoft.com/office/drawing/2014/main" id="{D74148BD-425C-1E1C-2EF7-22F190D3F29F}"/>
               </a:ext>
             </a:extLst>
           </p:cNvPr>
@@ -7813,7 +7814,7 @@
           <p:cNvPr id="3" name="ZoneTexte 2">
             <a:extLst>
               <a:ext uri="{FF2B5EF4-FFF2-40B4-BE49-F238E27FC236}">
-                <a16:creationId xmlns:a16="http://schemas.microsoft.com/office/drawing/2014/main" xmlns="" id="{050B5E4C-D856-2938-7B0B-B42260EEF289}"/>
+                <a16:creationId xmlns:a16="http://schemas.microsoft.com/office/drawing/2014/main" id="{050B5E4C-D856-2938-7B0B-B42260EEF289}"/>
               </a:ext>
             </a:extLst>
           </p:cNvPr>
@@ -7882,7 +7883,7 @@
           <p:cNvPr id="17" name="Rectangle 16">
             <a:extLst>
               <a:ext uri="{FF2B5EF4-FFF2-40B4-BE49-F238E27FC236}">
-                <a16:creationId xmlns:a16="http://schemas.microsoft.com/office/drawing/2014/main" xmlns="" id="{FD3615DE-5BDA-18B9-571A-4C849DD6C626}"/>
+                <a16:creationId xmlns:a16="http://schemas.microsoft.com/office/drawing/2014/main" id="{FD3615DE-5BDA-18B9-571A-4C849DD6C626}"/>
               </a:ext>
             </a:extLst>
           </p:cNvPr>
@@ -7937,7 +7938,7 @@
           <p:cNvPr id="4" name="Espace réservé du numéro de diapositive 3">
             <a:extLst>
               <a:ext uri="{FF2B5EF4-FFF2-40B4-BE49-F238E27FC236}">
-                <a16:creationId xmlns:a16="http://schemas.microsoft.com/office/drawing/2014/main" xmlns="" id="{6CE0B363-0A4F-F7AB-9B5E-E4FA59E704FD}"/>
+                <a16:creationId xmlns:a16="http://schemas.microsoft.com/office/drawing/2014/main" id="{6CE0B363-0A4F-F7AB-9B5E-E4FA59E704FD}"/>
               </a:ext>
             </a:extLst>
           </p:cNvPr>
@@ -7967,7 +7968,7 @@
           <p:cNvPr id="6" name="Connecteur droit 5">
             <a:extLst>
               <a:ext uri="{FF2B5EF4-FFF2-40B4-BE49-F238E27FC236}">
-                <a16:creationId xmlns:a16="http://schemas.microsoft.com/office/drawing/2014/main" xmlns="" id="{C8C0B7DE-409B-C260-E2AA-F6105134D738}"/>
+                <a16:creationId xmlns:a16="http://schemas.microsoft.com/office/drawing/2014/main" id="{C8C0B7DE-409B-C260-E2AA-F6105134D738}"/>
               </a:ext>
             </a:extLst>
           </p:cNvPr>
@@ -8011,7 +8012,7 @@
           <p:cNvPr id="7" name="Connecteur droit 6">
             <a:extLst>
               <a:ext uri="{FF2B5EF4-FFF2-40B4-BE49-F238E27FC236}">
-                <a16:creationId xmlns:a16="http://schemas.microsoft.com/office/drawing/2014/main" xmlns="" id="{3B46BF8F-6AA3-1C96-60BB-E05D5BA4BA47}"/>
+                <a16:creationId xmlns:a16="http://schemas.microsoft.com/office/drawing/2014/main" id="{3B46BF8F-6AA3-1C96-60BB-E05D5BA4BA47}"/>
               </a:ext>
             </a:extLst>
           </p:cNvPr>
@@ -8057,7 +8058,7 @@
           <p:cNvPr id="10" name="Connecteur droit 9">
             <a:extLst>
               <a:ext uri="{FF2B5EF4-FFF2-40B4-BE49-F238E27FC236}">
-                <a16:creationId xmlns:a16="http://schemas.microsoft.com/office/drawing/2014/main" xmlns="" id="{84B32B3C-35D3-AD76-9E44-FB1B95CC8198}"/>
+                <a16:creationId xmlns:a16="http://schemas.microsoft.com/office/drawing/2014/main" id="{84B32B3C-35D3-AD76-9E44-FB1B95CC8198}"/>
               </a:ext>
             </a:extLst>
           </p:cNvPr>
@@ -8103,7 +8104,7 @@
           <p:cNvPr id="13" name="ZoneTexte 12">
             <a:extLst>
               <a:ext uri="{FF2B5EF4-FFF2-40B4-BE49-F238E27FC236}">
-                <a16:creationId xmlns:a16="http://schemas.microsoft.com/office/drawing/2014/main" xmlns="" id="{B0B62E48-6C0E-64A0-89DA-879357075E02}"/>
+                <a16:creationId xmlns:a16="http://schemas.microsoft.com/office/drawing/2014/main" id="{B0B62E48-6C0E-64A0-89DA-879357075E02}"/>
               </a:ext>
             </a:extLst>
           </p:cNvPr>
@@ -8138,7 +8139,7 @@
           <p:cNvPr id="14" name="ZoneTexte 13">
             <a:extLst>
               <a:ext uri="{FF2B5EF4-FFF2-40B4-BE49-F238E27FC236}">
-                <a16:creationId xmlns:a16="http://schemas.microsoft.com/office/drawing/2014/main" xmlns="" id="{F5B6E875-A89F-BD6D-CC40-0001FF44BFDC}"/>
+                <a16:creationId xmlns:a16="http://schemas.microsoft.com/office/drawing/2014/main" id="{F5B6E875-A89F-BD6D-CC40-0001FF44BFDC}"/>
               </a:ext>
             </a:extLst>
           </p:cNvPr>
@@ -8173,7 +8174,7 @@
           <p:cNvPr id="15" name="ZoneTexte 14">
             <a:extLst>
               <a:ext uri="{FF2B5EF4-FFF2-40B4-BE49-F238E27FC236}">
-                <a16:creationId xmlns:a16="http://schemas.microsoft.com/office/drawing/2014/main" xmlns="" id="{7742D149-0729-5AB6-4F50-126876C6415C}"/>
+                <a16:creationId xmlns:a16="http://schemas.microsoft.com/office/drawing/2014/main" id="{7742D149-0729-5AB6-4F50-126876C6415C}"/>
               </a:ext>
             </a:extLst>
           </p:cNvPr>
@@ -8208,7 +8209,7 @@
           <p:cNvPr id="16" name="ZoneTexte 15">
             <a:extLst>
               <a:ext uri="{FF2B5EF4-FFF2-40B4-BE49-F238E27FC236}">
-                <a16:creationId xmlns:a16="http://schemas.microsoft.com/office/drawing/2014/main" xmlns="" id="{649F4A62-8C34-A822-6759-D65626E8D604}"/>
+                <a16:creationId xmlns:a16="http://schemas.microsoft.com/office/drawing/2014/main" id="{649F4A62-8C34-A822-6759-D65626E8D604}"/>
               </a:ext>
             </a:extLst>
           </p:cNvPr>
@@ -8247,7 +8248,7 @@
           <p:cNvPr id="2" name="Rectangle 1">
             <a:extLst>
               <a:ext uri="{FF2B5EF4-FFF2-40B4-BE49-F238E27FC236}">
-                <a16:creationId xmlns:a16="http://schemas.microsoft.com/office/drawing/2014/main" xmlns="" id="{D74148BD-425C-1E1C-2EF7-22F190D3F29F}"/>
+                <a16:creationId xmlns:a16="http://schemas.microsoft.com/office/drawing/2014/main" id="{D74148BD-425C-1E1C-2EF7-22F190D3F29F}"/>
               </a:ext>
             </a:extLst>
           </p:cNvPr>
@@ -8301,7 +8302,7 @@
           <p:cNvPr id="3" name="ZoneTexte 2">
             <a:extLst>
               <a:ext uri="{FF2B5EF4-FFF2-40B4-BE49-F238E27FC236}">
-                <a16:creationId xmlns:a16="http://schemas.microsoft.com/office/drawing/2014/main" xmlns="" id="{050B5E4C-D856-2938-7B0B-B42260EEF289}"/>
+                <a16:creationId xmlns:a16="http://schemas.microsoft.com/office/drawing/2014/main" id="{050B5E4C-D856-2938-7B0B-B42260EEF289}"/>
               </a:ext>
             </a:extLst>
           </p:cNvPr>
@@ -8340,7 +8341,7 @@
           <p:cNvPr id="5" name="Rectangle 4">
             <a:extLst>
               <a:ext uri="{FF2B5EF4-FFF2-40B4-BE49-F238E27FC236}">
-                <a16:creationId xmlns:a16="http://schemas.microsoft.com/office/drawing/2014/main" xmlns="" id="{D6FDDF5E-1A5C-93DF-BE13-8717EFE5B143}"/>
+                <a16:creationId xmlns:a16="http://schemas.microsoft.com/office/drawing/2014/main" id="{D6FDDF5E-1A5C-93DF-BE13-8717EFE5B143}"/>
               </a:ext>
             </a:extLst>
           </p:cNvPr>
@@ -8394,7 +8395,7 @@
           <p:cNvPr id="8" name="ZoneTexte 7">
             <a:extLst>
               <a:ext uri="{FF2B5EF4-FFF2-40B4-BE49-F238E27FC236}">
-                <a16:creationId xmlns:a16="http://schemas.microsoft.com/office/drawing/2014/main" xmlns="" id="{EB54BF83-1A94-F9C7-C26B-C188FC713778}"/>
+                <a16:creationId xmlns:a16="http://schemas.microsoft.com/office/drawing/2014/main" id="{EB54BF83-1A94-F9C7-C26B-C188FC713778}"/>
               </a:ext>
             </a:extLst>
           </p:cNvPr>
@@ -8463,7 +8464,7 @@
           <p:cNvPr id="4" name="Espace réservé du numéro de diapositive 3">
             <a:extLst>
               <a:ext uri="{FF2B5EF4-FFF2-40B4-BE49-F238E27FC236}">
-                <a16:creationId xmlns:a16="http://schemas.microsoft.com/office/drawing/2014/main" xmlns="" id="{175B8FCA-3D03-2C2C-D00A-53A9C22D1E83}"/>
+                <a16:creationId xmlns:a16="http://schemas.microsoft.com/office/drawing/2014/main" id="{175B8FCA-3D03-2C2C-D00A-53A9C22D1E83}"/>
               </a:ext>
             </a:extLst>
           </p:cNvPr>
@@ -8493,7 +8494,7 @@
           <p:cNvPr id="6" name="ZoneTexte 5">
             <a:extLst>
               <a:ext uri="{FF2B5EF4-FFF2-40B4-BE49-F238E27FC236}">
-                <a16:creationId xmlns:a16="http://schemas.microsoft.com/office/drawing/2014/main" xmlns="" id="{7DAD2C3E-1FD3-0E42-0B89-DB2F1B7833AF}"/>
+                <a16:creationId xmlns:a16="http://schemas.microsoft.com/office/drawing/2014/main" id="{7DAD2C3E-1FD3-0E42-0B89-DB2F1B7833AF}"/>
               </a:ext>
             </a:extLst>
           </p:cNvPr>
@@ -8566,7 +8567,7 @@
           <p:cNvPr id="17" name="Rectangle 16">
             <a:extLst>
               <a:ext uri="{FF2B5EF4-FFF2-40B4-BE49-F238E27FC236}">
-                <a16:creationId xmlns:a16="http://schemas.microsoft.com/office/drawing/2014/main" xmlns="" id="{FD3615DE-5BDA-18B9-571A-4C849DD6C626}"/>
+                <a16:creationId xmlns:a16="http://schemas.microsoft.com/office/drawing/2014/main" id="{FD3615DE-5BDA-18B9-571A-4C849DD6C626}"/>
               </a:ext>
             </a:extLst>
           </p:cNvPr>
@@ -8621,7 +8622,7 @@
           <p:cNvPr id="4" name="Espace réservé du numéro de diapositive 3">
             <a:extLst>
               <a:ext uri="{FF2B5EF4-FFF2-40B4-BE49-F238E27FC236}">
-                <a16:creationId xmlns:a16="http://schemas.microsoft.com/office/drawing/2014/main" xmlns="" id="{6CE0B363-0A4F-F7AB-9B5E-E4FA59E704FD}"/>
+                <a16:creationId xmlns:a16="http://schemas.microsoft.com/office/drawing/2014/main" id="{6CE0B363-0A4F-F7AB-9B5E-E4FA59E704FD}"/>
               </a:ext>
             </a:extLst>
           </p:cNvPr>
@@ -8651,7 +8652,7 @@
           <p:cNvPr id="6" name="Connecteur droit 5">
             <a:extLst>
               <a:ext uri="{FF2B5EF4-FFF2-40B4-BE49-F238E27FC236}">
-                <a16:creationId xmlns:a16="http://schemas.microsoft.com/office/drawing/2014/main" xmlns="" id="{C8C0B7DE-409B-C260-E2AA-F6105134D738}"/>
+                <a16:creationId xmlns:a16="http://schemas.microsoft.com/office/drawing/2014/main" id="{C8C0B7DE-409B-C260-E2AA-F6105134D738}"/>
               </a:ext>
             </a:extLst>
           </p:cNvPr>
@@ -8695,7 +8696,7 @@
           <p:cNvPr id="7" name="Connecteur droit 6">
             <a:extLst>
               <a:ext uri="{FF2B5EF4-FFF2-40B4-BE49-F238E27FC236}">
-                <a16:creationId xmlns:a16="http://schemas.microsoft.com/office/drawing/2014/main" xmlns="" id="{3B46BF8F-6AA3-1C96-60BB-E05D5BA4BA47}"/>
+                <a16:creationId xmlns:a16="http://schemas.microsoft.com/office/drawing/2014/main" id="{3B46BF8F-6AA3-1C96-60BB-E05D5BA4BA47}"/>
               </a:ext>
             </a:extLst>
           </p:cNvPr>
@@ -8741,7 +8742,7 @@
           <p:cNvPr id="10" name="Connecteur droit 9">
             <a:extLst>
               <a:ext uri="{FF2B5EF4-FFF2-40B4-BE49-F238E27FC236}">
-                <a16:creationId xmlns:a16="http://schemas.microsoft.com/office/drawing/2014/main" xmlns="" id="{84B32B3C-35D3-AD76-9E44-FB1B95CC8198}"/>
+                <a16:creationId xmlns:a16="http://schemas.microsoft.com/office/drawing/2014/main" id="{84B32B3C-35D3-AD76-9E44-FB1B95CC8198}"/>
               </a:ext>
             </a:extLst>
           </p:cNvPr>
@@ -8787,7 +8788,7 @@
           <p:cNvPr id="13" name="ZoneTexte 12">
             <a:extLst>
               <a:ext uri="{FF2B5EF4-FFF2-40B4-BE49-F238E27FC236}">
-                <a16:creationId xmlns:a16="http://schemas.microsoft.com/office/drawing/2014/main" xmlns="" id="{B0B62E48-6C0E-64A0-89DA-879357075E02}"/>
+                <a16:creationId xmlns:a16="http://schemas.microsoft.com/office/drawing/2014/main" id="{B0B62E48-6C0E-64A0-89DA-879357075E02}"/>
               </a:ext>
             </a:extLst>
           </p:cNvPr>
@@ -8822,7 +8823,7 @@
           <p:cNvPr id="14" name="ZoneTexte 13">
             <a:extLst>
               <a:ext uri="{FF2B5EF4-FFF2-40B4-BE49-F238E27FC236}">
-                <a16:creationId xmlns:a16="http://schemas.microsoft.com/office/drawing/2014/main" xmlns="" id="{F5B6E875-A89F-BD6D-CC40-0001FF44BFDC}"/>
+                <a16:creationId xmlns:a16="http://schemas.microsoft.com/office/drawing/2014/main" id="{F5B6E875-A89F-BD6D-CC40-0001FF44BFDC}"/>
               </a:ext>
             </a:extLst>
           </p:cNvPr>
@@ -8857,7 +8858,7 @@
           <p:cNvPr id="15" name="ZoneTexte 14">
             <a:extLst>
               <a:ext uri="{FF2B5EF4-FFF2-40B4-BE49-F238E27FC236}">
-                <a16:creationId xmlns:a16="http://schemas.microsoft.com/office/drawing/2014/main" xmlns="" id="{7742D149-0729-5AB6-4F50-126876C6415C}"/>
+                <a16:creationId xmlns:a16="http://schemas.microsoft.com/office/drawing/2014/main" id="{7742D149-0729-5AB6-4F50-126876C6415C}"/>
               </a:ext>
             </a:extLst>
           </p:cNvPr>
@@ -8892,7 +8893,7 @@
           <p:cNvPr id="2" name="Rectangle 1">
             <a:extLst>
               <a:ext uri="{FF2B5EF4-FFF2-40B4-BE49-F238E27FC236}">
-                <a16:creationId xmlns:a16="http://schemas.microsoft.com/office/drawing/2014/main" xmlns="" id="{D74148BD-425C-1E1C-2EF7-22F190D3F29F}"/>
+                <a16:creationId xmlns:a16="http://schemas.microsoft.com/office/drawing/2014/main" id="{D74148BD-425C-1E1C-2EF7-22F190D3F29F}"/>
               </a:ext>
             </a:extLst>
           </p:cNvPr>
@@ -8946,7 +8947,7 @@
           <p:cNvPr id="5" name="Rectangle 4">
             <a:extLst>
               <a:ext uri="{FF2B5EF4-FFF2-40B4-BE49-F238E27FC236}">
-                <a16:creationId xmlns:a16="http://schemas.microsoft.com/office/drawing/2014/main" xmlns="" id="{D6FDDF5E-1A5C-93DF-BE13-8717EFE5B143}"/>
+                <a16:creationId xmlns:a16="http://schemas.microsoft.com/office/drawing/2014/main" id="{D6FDDF5E-1A5C-93DF-BE13-8717EFE5B143}"/>
               </a:ext>
             </a:extLst>
           </p:cNvPr>
@@ -9000,7 +9001,7 @@
           <p:cNvPr id="9" name="Forme libre : forme 8">
             <a:extLst>
               <a:ext uri="{FF2B5EF4-FFF2-40B4-BE49-F238E27FC236}">
-                <a16:creationId xmlns:a16="http://schemas.microsoft.com/office/drawing/2014/main" xmlns="" id="{01C176DA-F3D6-EA69-0582-EEBE5408991D}"/>
+                <a16:creationId xmlns:a16="http://schemas.microsoft.com/office/drawing/2014/main" id="{01C176DA-F3D6-EA69-0582-EEBE5408991D}"/>
               </a:ext>
             </a:extLst>
           </p:cNvPr>
@@ -9105,7 +9106,7 @@
           <p:cNvPr id="11" name="ZoneTexte 10">
             <a:extLst>
               <a:ext uri="{FF2B5EF4-FFF2-40B4-BE49-F238E27FC236}">
-                <a16:creationId xmlns:a16="http://schemas.microsoft.com/office/drawing/2014/main" xmlns="" id="{A0E955F1-9F3A-6AAC-DF38-6E169209AC18}"/>
+                <a16:creationId xmlns:a16="http://schemas.microsoft.com/office/drawing/2014/main" id="{A0E955F1-9F3A-6AAC-DF38-6E169209AC18}"/>
               </a:ext>
             </a:extLst>
           </p:cNvPr>
@@ -9296,7 +9297,7 @@
           <p:cNvPr id="2" name="Espace réservé du numéro de diapositive 1">
             <a:extLst>
               <a:ext uri="{FF2B5EF4-FFF2-40B4-BE49-F238E27FC236}">
-                <a16:creationId xmlns:a16="http://schemas.microsoft.com/office/drawing/2014/main" xmlns="" id="{AE95E95D-1096-4252-8221-235BCA371A64}"/>
+                <a16:creationId xmlns:a16="http://schemas.microsoft.com/office/drawing/2014/main" id="{AE95E95D-1096-4252-8221-235BCA371A64}"/>
               </a:ext>
             </a:extLst>
           </p:cNvPr>
@@ -9356,7 +9357,7 @@
           <p:cNvPr id="4" name="Espace réservé du numéro de diapositive 3">
             <a:extLst>
               <a:ext uri="{FF2B5EF4-FFF2-40B4-BE49-F238E27FC236}">
-                <a16:creationId xmlns:a16="http://schemas.microsoft.com/office/drawing/2014/main" xmlns="" id="{A04E9DE2-D09D-06A3-2E9A-4AF1D6A3D455}"/>
+                <a16:creationId xmlns:a16="http://schemas.microsoft.com/office/drawing/2014/main" id="{A04E9DE2-D09D-06A3-2E9A-4AF1D6A3D455}"/>
               </a:ext>
             </a:extLst>
           </p:cNvPr>
@@ -9386,7 +9387,7 @@
           <p:cNvPr id="5" name="ZoneTexte 4">
             <a:extLst>
               <a:ext uri="{FF2B5EF4-FFF2-40B4-BE49-F238E27FC236}">
-                <a16:creationId xmlns:a16="http://schemas.microsoft.com/office/drawing/2014/main" xmlns="" id="{5C808CFE-2CE1-6EB9-13B9-7E866432690A}"/>
+                <a16:creationId xmlns:a16="http://schemas.microsoft.com/office/drawing/2014/main" id="{5C808CFE-2CE1-6EB9-13B9-7E866432690A}"/>
               </a:ext>
             </a:extLst>
           </p:cNvPr>
@@ -9422,7 +9423,7 @@
           <p:cNvPr id="6" name="ZoneTexte 5">
             <a:extLst>
               <a:ext uri="{FF2B5EF4-FFF2-40B4-BE49-F238E27FC236}">
-                <a16:creationId xmlns:a16="http://schemas.microsoft.com/office/drawing/2014/main" xmlns="" id="{AA03B0F5-DA4A-400E-0204-3BB78C70238B}"/>
+                <a16:creationId xmlns:a16="http://schemas.microsoft.com/office/drawing/2014/main" id="{AA03B0F5-DA4A-400E-0204-3BB78C70238B}"/>
               </a:ext>
             </a:extLst>
           </p:cNvPr>
@@ -9457,7 +9458,7 @@
           <p:cNvPr id="7" name="ZoneTexte 6">
             <a:extLst>
               <a:ext uri="{FF2B5EF4-FFF2-40B4-BE49-F238E27FC236}">
-                <a16:creationId xmlns:a16="http://schemas.microsoft.com/office/drawing/2014/main" xmlns="" id="{D7FDCB78-22BA-F5ED-A690-AFBFECB68578}"/>
+                <a16:creationId xmlns:a16="http://schemas.microsoft.com/office/drawing/2014/main" id="{D7FDCB78-22BA-F5ED-A690-AFBFECB68578}"/>
               </a:ext>
             </a:extLst>
           </p:cNvPr>
@@ -9492,7 +9493,7 @@
           <p:cNvPr id="9" name="Connecteur droit avec flèche 8">
             <a:extLst>
               <a:ext uri="{FF2B5EF4-FFF2-40B4-BE49-F238E27FC236}">
-                <a16:creationId xmlns:a16="http://schemas.microsoft.com/office/drawing/2014/main" xmlns="" id="{BF934E12-CAD0-23EB-DBE6-ABC89E5307E2}"/>
+                <a16:creationId xmlns:a16="http://schemas.microsoft.com/office/drawing/2014/main" id="{BF934E12-CAD0-23EB-DBE6-ABC89E5307E2}"/>
               </a:ext>
             </a:extLst>
           </p:cNvPr>
@@ -9540,7 +9541,7 @@
           <p:cNvPr id="10" name="Connecteur droit avec flèche 9">
             <a:extLst>
               <a:ext uri="{FF2B5EF4-FFF2-40B4-BE49-F238E27FC236}">
-                <a16:creationId xmlns:a16="http://schemas.microsoft.com/office/drawing/2014/main" xmlns="" id="{18B70E2C-40D0-251D-8789-E3618A8C6383}"/>
+                <a16:creationId xmlns:a16="http://schemas.microsoft.com/office/drawing/2014/main" id="{18B70E2C-40D0-251D-8789-E3618A8C6383}"/>
               </a:ext>
             </a:extLst>
           </p:cNvPr>
@@ -9589,7 +9590,7 @@
           <p:cNvPr id="13" name="Connecteur droit avec flèche 12">
             <a:extLst>
               <a:ext uri="{FF2B5EF4-FFF2-40B4-BE49-F238E27FC236}">
-                <a16:creationId xmlns:a16="http://schemas.microsoft.com/office/drawing/2014/main" xmlns="" id="{93B00BE1-071A-0971-69C8-95777D33205C}"/>
+                <a16:creationId xmlns:a16="http://schemas.microsoft.com/office/drawing/2014/main" id="{93B00BE1-071A-0971-69C8-95777D33205C}"/>
               </a:ext>
             </a:extLst>
           </p:cNvPr>
@@ -9636,7 +9637,7 @@
           <p:cNvPr id="17" name="Connecteur droit avec flèche 16">
             <a:extLst>
               <a:ext uri="{FF2B5EF4-FFF2-40B4-BE49-F238E27FC236}">
-                <a16:creationId xmlns:a16="http://schemas.microsoft.com/office/drawing/2014/main" xmlns="" id="{13D05068-CD37-E337-C2E5-801BE366342B}"/>
+                <a16:creationId xmlns:a16="http://schemas.microsoft.com/office/drawing/2014/main" id="{13D05068-CD37-E337-C2E5-801BE366342B}"/>
               </a:ext>
             </a:extLst>
           </p:cNvPr>
@@ -9684,7 +9685,7 @@
           <p:cNvPr id="20" name="ZoneTexte 19">
             <a:extLst>
               <a:ext uri="{FF2B5EF4-FFF2-40B4-BE49-F238E27FC236}">
-                <a16:creationId xmlns:a16="http://schemas.microsoft.com/office/drawing/2014/main" xmlns="" id="{0AC6D882-269D-0B70-F756-F23A448B49D6}"/>
+                <a16:creationId xmlns:a16="http://schemas.microsoft.com/office/drawing/2014/main" id="{0AC6D882-269D-0B70-F756-F23A448B49D6}"/>
               </a:ext>
             </a:extLst>
           </p:cNvPr>
@@ -9720,7 +9721,7 @@
           <p:cNvPr id="21" name="ZoneTexte 20">
             <a:extLst>
               <a:ext uri="{FF2B5EF4-FFF2-40B4-BE49-F238E27FC236}">
-                <a16:creationId xmlns:a16="http://schemas.microsoft.com/office/drawing/2014/main" xmlns="" id="{2C4C7117-DA31-952B-D0D8-C5DBF64248F7}"/>
+                <a16:creationId xmlns:a16="http://schemas.microsoft.com/office/drawing/2014/main" id="{2C4C7117-DA31-952B-D0D8-C5DBF64248F7}"/>
               </a:ext>
             </a:extLst>
           </p:cNvPr>
@@ -9773,7 +9774,7 @@
           <p:cNvPr id="23" name="Connecteur droit 22">
             <a:extLst>
               <a:ext uri="{FF2B5EF4-FFF2-40B4-BE49-F238E27FC236}">
-                <a16:creationId xmlns:a16="http://schemas.microsoft.com/office/drawing/2014/main" xmlns="" id="{CA4CA586-90F6-ACBC-6EEB-E0C9CEB8281D}"/>
+                <a16:creationId xmlns:a16="http://schemas.microsoft.com/office/drawing/2014/main" id="{CA4CA586-90F6-ACBC-6EEB-E0C9CEB8281D}"/>
               </a:ext>
             </a:extLst>
           </p:cNvPr>
@@ -9817,7 +9818,7 @@
           <p:cNvPr id="24" name="Connecteur droit 23">
             <a:extLst>
               <a:ext uri="{FF2B5EF4-FFF2-40B4-BE49-F238E27FC236}">
-                <a16:creationId xmlns:a16="http://schemas.microsoft.com/office/drawing/2014/main" xmlns="" id="{E395F040-65AF-454F-6E33-3B9D49DE7BE9}"/>
+                <a16:creationId xmlns:a16="http://schemas.microsoft.com/office/drawing/2014/main" id="{E395F040-65AF-454F-6E33-3B9D49DE7BE9}"/>
               </a:ext>
             </a:extLst>
           </p:cNvPr>
@@ -9864,7 +9865,7 @@
           <p:cNvPr id="27" name="Connecteur droit 26">
             <a:extLst>
               <a:ext uri="{FF2B5EF4-FFF2-40B4-BE49-F238E27FC236}">
-                <a16:creationId xmlns:a16="http://schemas.microsoft.com/office/drawing/2014/main" xmlns="" id="{E3307C58-18DF-22DA-FD88-8AF40F6D43DB}"/>
+                <a16:creationId xmlns:a16="http://schemas.microsoft.com/office/drawing/2014/main" id="{E3307C58-18DF-22DA-FD88-8AF40F6D43DB}"/>
               </a:ext>
             </a:extLst>
           </p:cNvPr>
@@ -9911,7 +9912,7 @@
           <p:cNvPr id="28" name="Connecteur droit 27">
             <a:extLst>
               <a:ext uri="{FF2B5EF4-FFF2-40B4-BE49-F238E27FC236}">
-                <a16:creationId xmlns:a16="http://schemas.microsoft.com/office/drawing/2014/main" xmlns="" id="{F5F03664-05C6-A2F9-5708-E0A418DDFD08}"/>
+                <a16:creationId xmlns:a16="http://schemas.microsoft.com/office/drawing/2014/main" id="{F5F03664-05C6-A2F9-5708-E0A418DDFD08}"/>
               </a:ext>
             </a:extLst>
           </p:cNvPr>
@@ -9958,7 +9959,7 @@
           <p:cNvPr id="29" name="ZoneTexte 28">
             <a:extLst>
               <a:ext uri="{FF2B5EF4-FFF2-40B4-BE49-F238E27FC236}">
-                <a16:creationId xmlns:a16="http://schemas.microsoft.com/office/drawing/2014/main" xmlns="" id="{3727EE9E-7A08-885C-13D6-7B5C9E1A544F}"/>
+                <a16:creationId xmlns:a16="http://schemas.microsoft.com/office/drawing/2014/main" id="{3727EE9E-7A08-885C-13D6-7B5C9E1A544F}"/>
               </a:ext>
             </a:extLst>
           </p:cNvPr>
@@ -10008,7 +10009,7 @@
           <p:cNvPr id="30" name="Connecteur droit 29">
             <a:extLst>
               <a:ext uri="{FF2B5EF4-FFF2-40B4-BE49-F238E27FC236}">
-                <a16:creationId xmlns:a16="http://schemas.microsoft.com/office/drawing/2014/main" xmlns="" id="{6B42BA14-67F1-2078-52CD-54FE9F5A82E3}"/>
+                <a16:creationId xmlns:a16="http://schemas.microsoft.com/office/drawing/2014/main" id="{6B42BA14-67F1-2078-52CD-54FE9F5A82E3}"/>
               </a:ext>
             </a:extLst>
           </p:cNvPr>
@@ -10054,7 +10055,7 @@
           <p:cNvPr id="31" name="Connecteur droit 30">
             <a:extLst>
               <a:ext uri="{FF2B5EF4-FFF2-40B4-BE49-F238E27FC236}">
-                <a16:creationId xmlns:a16="http://schemas.microsoft.com/office/drawing/2014/main" xmlns="" id="{2A8209EF-DE79-3D2F-6B3B-7436013F8520}"/>
+                <a16:creationId xmlns:a16="http://schemas.microsoft.com/office/drawing/2014/main" id="{2A8209EF-DE79-3D2F-6B3B-7436013F8520}"/>
               </a:ext>
             </a:extLst>
           </p:cNvPr>
@@ -10101,7 +10102,7 @@
           <p:cNvPr id="32" name="Connecteur droit 31">
             <a:extLst>
               <a:ext uri="{FF2B5EF4-FFF2-40B4-BE49-F238E27FC236}">
-                <a16:creationId xmlns:a16="http://schemas.microsoft.com/office/drawing/2014/main" xmlns="" id="{F3504475-67F2-155A-2BFE-28A39131D9FF}"/>
+                <a16:creationId xmlns:a16="http://schemas.microsoft.com/office/drawing/2014/main" id="{F3504475-67F2-155A-2BFE-28A39131D9FF}"/>
               </a:ext>
             </a:extLst>
           </p:cNvPr>
@@ -10148,7 +10149,7 @@
           <p:cNvPr id="33" name="Connecteur droit 32">
             <a:extLst>
               <a:ext uri="{FF2B5EF4-FFF2-40B4-BE49-F238E27FC236}">
-                <a16:creationId xmlns:a16="http://schemas.microsoft.com/office/drawing/2014/main" xmlns="" id="{1F2116D1-E504-7F65-4383-417B8763106C}"/>
+                <a16:creationId xmlns:a16="http://schemas.microsoft.com/office/drawing/2014/main" id="{1F2116D1-E504-7F65-4383-417B8763106C}"/>
               </a:ext>
             </a:extLst>
           </p:cNvPr>
@@ -10195,7 +10196,7 @@
           <p:cNvPr id="35" name="ZoneTexte 34">
             <a:extLst>
               <a:ext uri="{FF2B5EF4-FFF2-40B4-BE49-F238E27FC236}">
-                <a16:creationId xmlns:a16="http://schemas.microsoft.com/office/drawing/2014/main" xmlns="" id="{BF9772DA-FAC5-FFA9-30D4-FC2CD9A35D70}"/>
+                <a16:creationId xmlns:a16="http://schemas.microsoft.com/office/drawing/2014/main" id="{BF9772DA-FAC5-FFA9-30D4-FC2CD9A35D70}"/>
               </a:ext>
             </a:extLst>
           </p:cNvPr>
@@ -10290,10 +10291,145 @@
       </p:grpSpPr>
       <p:sp>
         <p:nvSpPr>
+          <p:cNvPr id="4" name="Espace réservé du numéro de diapositive 3">
+            <a:extLst>
+              <a:ext uri="{FF2B5EF4-FFF2-40B4-BE49-F238E27FC236}">
+                <a16:creationId xmlns:a16="http://schemas.microsoft.com/office/drawing/2014/main" id="{D9E69CE4-1D33-73B4-75B0-CD52E4D161F1}"/>
+              </a:ext>
+            </a:extLst>
+          </p:cNvPr>
+          <p:cNvSpPr>
+            <a:spLocks noGrp="1"/>
+          </p:cNvSpPr>
+          <p:nvPr>
+            <p:ph type="sldNum" sz="quarter" idx="12"/>
+          </p:nvPr>
+        </p:nvSpPr>
+        <p:spPr/>
+        <p:txBody>
+          <a:bodyPr/>
+          <a:lstStyle/>
+          <a:p>
+            <a:fld id="{228B8149-0202-48DD-B0CD-6908EF5896EA}" type="slidenum">
+              <a:rPr lang="fr-FR" smtClean="0"/>
+              <a:t>23</a:t>
+            </a:fld>
+            <a:endParaRPr lang="fr-FR"/>
+          </a:p>
+        </p:txBody>
+      </p:sp>
+      <p:pic>
+        <p:nvPicPr>
+          <p:cNvPr id="6" name="Image 5">
+            <a:extLst>
+              <a:ext uri="{FF2B5EF4-FFF2-40B4-BE49-F238E27FC236}">
+                <a16:creationId xmlns:a16="http://schemas.microsoft.com/office/drawing/2014/main" id="{E9BAA193-FE9A-B482-3CD2-A15B847E27A7}"/>
+              </a:ext>
+            </a:extLst>
+          </p:cNvPr>
+          <p:cNvPicPr>
+            <a:picLocks noChangeAspect="1"/>
+          </p:cNvPicPr>
+          <p:nvPr/>
+        </p:nvPicPr>
+        <p:blipFill>
+          <a:blip r:embed="rId2">
+            <a:extLst>
+              <a:ext uri="{28A0092B-C50C-407E-A947-70E740481C1C}">
+                <a14:useLocalDpi xmlns:a14="http://schemas.microsoft.com/office/drawing/2010/main" val="0"/>
+              </a:ext>
+            </a:extLst>
+          </a:blip>
+          <a:stretch>
+            <a:fillRect/>
+          </a:stretch>
+        </p:blipFill>
+        <p:spPr>
+          <a:xfrm>
+            <a:off x="0" y="22497"/>
+            <a:ext cx="4749800" cy="6849631"/>
+          </a:xfrm>
+          <a:prstGeom prst="rect">
+            <a:avLst/>
+          </a:prstGeom>
+        </p:spPr>
+      </p:pic>
+      <p:sp>
+        <p:nvSpPr>
+          <p:cNvPr id="7" name="ZoneTexte 6">
+            <a:extLst>
+              <a:ext uri="{FF2B5EF4-FFF2-40B4-BE49-F238E27FC236}">
+                <a16:creationId xmlns:a16="http://schemas.microsoft.com/office/drawing/2014/main" id="{CAEC0171-7C3B-A7CB-03FB-2E5E47230F25}"/>
+              </a:ext>
+            </a:extLst>
+          </p:cNvPr>
+          <p:cNvSpPr txBox="1"/>
+          <p:nvPr/>
+        </p:nvSpPr>
+        <p:spPr>
+          <a:xfrm>
+            <a:off x="5245100" y="711200"/>
+            <a:ext cx="3270250" cy="523220"/>
+          </a:xfrm>
+          <a:prstGeom prst="rect">
+            <a:avLst/>
+          </a:prstGeom>
+          <a:noFill/>
+        </p:spPr>
+        <p:txBody>
+          <a:bodyPr wrap="square" rtlCol="0">
+            <a:spAutoFit/>
+          </a:bodyPr>
+          <a:lstStyle/>
+          <a:p>
+            <a:r>
+              <a:rPr lang="fr-FR" sz="2800" dirty="0"/>
+              <a:t>A paraître – </a:t>
+            </a:r>
+            <a:r>
+              <a:rPr lang="fr-FR" sz="2800"/>
+              <a:t>mi 2025</a:t>
+            </a:r>
+            <a:endParaRPr lang="fr-FR" sz="2800" dirty="0"/>
+          </a:p>
+        </p:txBody>
+      </p:sp>
+    </p:spTree>
+    <p:extLst>
+      <p:ext uri="{BB962C8B-B14F-4D97-AF65-F5344CB8AC3E}">
+        <p14:creationId xmlns:p14="http://schemas.microsoft.com/office/powerpoint/2010/main" val="453136678"/>
+      </p:ext>
+    </p:extLst>
+  </p:cSld>
+  <p:clrMapOvr>
+    <a:masterClrMapping/>
+  </p:clrMapOvr>
+</p:sld>
+</file>
+
+<file path=ppt/slides/slide24.xml><?xml version="1.0" encoding="utf-8"?>
+<p:sld xmlns:a="http://schemas.openxmlformats.org/drawingml/2006/main" xmlns:r="http://schemas.openxmlformats.org/officeDocument/2006/relationships" xmlns:p="http://schemas.openxmlformats.org/presentationml/2006/main">
+  <p:cSld>
+    <p:spTree>
+      <p:nvGrpSpPr>
+        <p:cNvPr id="1" name=""/>
+        <p:cNvGrpSpPr/>
+        <p:nvPr/>
+      </p:nvGrpSpPr>
+      <p:grpSpPr>
+        <a:xfrm>
+          <a:off x="0" y="0"/>
+          <a:ext cx="0" cy="0"/>
+          <a:chOff x="0" y="0"/>
+          <a:chExt cx="0" cy="0"/>
+        </a:xfrm>
+      </p:grpSpPr>
+      <p:sp>
+        <p:nvSpPr>
           <p:cNvPr id="3" name="Espace réservé du contenu 2">
             <a:extLst>
               <a:ext uri="{FF2B5EF4-FFF2-40B4-BE49-F238E27FC236}">
-                <a16:creationId xmlns:a16="http://schemas.microsoft.com/office/drawing/2014/main" xmlns="" id="{6DC2C8D9-9B4A-D399-07FA-E600AC9ECC54}"/>
+                <a16:creationId xmlns:a16="http://schemas.microsoft.com/office/drawing/2014/main" id="{6DC2C8D9-9B4A-D399-07FA-E600AC9ECC54}"/>
               </a:ext>
             </a:extLst>
           </p:cNvPr>
@@ -10326,7 +10462,7 @@
           <p:cNvPr id="4" name="Espace réservé du numéro de diapositive 3">
             <a:extLst>
               <a:ext uri="{FF2B5EF4-FFF2-40B4-BE49-F238E27FC236}">
-                <a16:creationId xmlns:a16="http://schemas.microsoft.com/office/drawing/2014/main" xmlns="" id="{7C295688-5792-1DBF-F1CE-982756826205}"/>
+                <a16:creationId xmlns:a16="http://schemas.microsoft.com/office/drawing/2014/main" id="{7C295688-5792-1DBF-F1CE-982756826205}"/>
               </a:ext>
             </a:extLst>
           </p:cNvPr>
@@ -10345,7 +10481,7 @@
             <a:fld id="{6697765D-F622-4BC4-AC55-80A3CC4A834C}" type="slidenum">
               <a:rPr lang="fr-FR" smtClean="0"/>
               <a:pPr/>
-              <a:t>23</a:t>
+              <a:t>24</a:t>
             </a:fld>
             <a:endParaRPr lang="fr-FR"/>
           </a:p>
@@ -10629,12 +10765,8 @@
           </a:p>
           <a:p>
             <a:r>
-              <a:rPr lang="fr-FR" sz="1600" i="1" dirty="0" smtClean="0"/>
-              <a:t>Flexibilisation </a:t>
-            </a:r>
-            <a:r>
               <a:rPr lang="fr-FR" sz="1600" i="1" dirty="0"/>
-              <a:t>du cadre d’inférence </a:t>
+              <a:t>Flexibilisation du cadre d’inférence </a:t>
             </a:r>
             <a:r>
               <a:rPr lang="fr-FR" sz="1600" b="1" i="1" dirty="0"/>
@@ -12523,7 +12655,7 @@
           <p:cNvPr id="2" name="Espace réservé du numéro de diapositive 1">
             <a:extLst>
               <a:ext uri="{FF2B5EF4-FFF2-40B4-BE49-F238E27FC236}">
-                <a16:creationId xmlns:a16="http://schemas.microsoft.com/office/drawing/2014/main" xmlns="" id="{8DBDE986-12CB-4CB8-A1C0-1E0340D85408}"/>
+                <a16:creationId xmlns:a16="http://schemas.microsoft.com/office/drawing/2014/main" id="{8DBDE986-12CB-4CB8-A1C0-1E0340D85408}"/>
               </a:ext>
             </a:extLst>
           </p:cNvPr>

</xml_diff>